<commit_message>
mise en place de la version 1.2 du mémoire complet
</commit_message>
<xml_diff>
--- a/CH2. Modélisation du palier hydrodynamique/figures/figure_ paliers hydrodynamiques.pptx
+++ b/CH2. Modélisation du palier hydrodynamique/figures/figure_ paliers hydrodynamiques.pptx
@@ -487,8 +487,8 @@
           <c:showPercent val="0"/>
           <c:showBubbleSize val="0"/>
         </c:dLbls>
-        <c:axId val="287680528"/>
-        <c:axId val="287674256"/>
+        <c:axId val="183686280"/>
+        <c:axId val="183680792"/>
         <c:extLst xmlns:c16r2="http://schemas.microsoft.com/office/drawing/2015/06/chart">
           <c:ext xmlns:c15="http://schemas.microsoft.com/office/drawing/2012/chart" uri="{02D57815-91ED-43cb-92C2-25804820EDAC}">
             <c15:filteredScatterSeries>
@@ -756,7 +756,7 @@
         </c:extLst>
       </c:scatterChart>
       <c:valAx>
-        <c:axId val="287680528"/>
+        <c:axId val="183686280"/>
         <c:scaling>
           <c:orientation val="minMax"/>
           <c:max val="252.5"/>
@@ -874,13 +874,13 @@
             <a:endParaRPr lang="fr-FR"/>
           </a:p>
         </c:txPr>
-        <c:crossAx val="287674256"/>
+        <c:crossAx val="183680792"/>
         <c:crosses val="autoZero"/>
         <c:crossBetween val="midCat"/>
         <c:majorUnit val="25"/>
       </c:valAx>
       <c:valAx>
-        <c:axId val="287674256"/>
+        <c:axId val="183680792"/>
         <c:scaling>
           <c:orientation val="minMax"/>
           <c:max val="50"/>
@@ -993,7 +993,7 @@
             <a:endParaRPr lang="fr-FR"/>
           </a:p>
         </c:txPr>
-        <c:crossAx val="287680528"/>
+        <c:crossAx val="183686280"/>
         <c:crosses val="autoZero"/>
         <c:crossBetween val="midCat"/>
       </c:valAx>
@@ -1447,8 +1447,8 @@
           <c:showPercent val="0"/>
           <c:showBubbleSize val="0"/>
         </c:dLbls>
-        <c:axId val="289529200"/>
-        <c:axId val="289531552"/>
+        <c:axId val="499387784"/>
+        <c:axId val="500791280"/>
         <c:extLst xmlns:c16r2="http://schemas.microsoft.com/office/drawing/2015/06/chart">
           <c:ext xmlns:c15="http://schemas.microsoft.com/office/drawing/2012/chart" uri="{02D57815-91ED-43cb-92C2-25804820EDAC}">
             <c15:filteredScatterSeries>
@@ -1716,7 +1716,7 @@
         </c:extLst>
       </c:scatterChart>
       <c:valAx>
-        <c:axId val="289529200"/>
+        <c:axId val="499387784"/>
         <c:scaling>
           <c:orientation val="minMax"/>
           <c:max val="252.5"/>
@@ -1822,13 +1822,13 @@
             <a:endParaRPr lang="fr-FR"/>
           </a:p>
         </c:txPr>
-        <c:crossAx val="289531552"/>
+        <c:crossAx val="500791280"/>
         <c:crosses val="autoZero"/>
         <c:crossBetween val="midCat"/>
         <c:majorUnit val="25"/>
       </c:valAx>
       <c:valAx>
-        <c:axId val="289531552"/>
+        <c:axId val="500791280"/>
         <c:scaling>
           <c:orientation val="minMax"/>
         </c:scaling>
@@ -1940,7 +1940,7 @@
             <a:endParaRPr lang="fr-FR"/>
           </a:p>
         </c:txPr>
-        <c:crossAx val="289529200"/>
+        <c:crossAx val="499387784"/>
         <c:crosses val="autoZero"/>
         <c:crossBetween val="midCat"/>
       </c:valAx>
@@ -2376,8 +2376,8 @@
           <c:showPercent val="0"/>
           <c:showBubbleSize val="0"/>
         </c:dLbls>
-        <c:axId val="289533904"/>
-        <c:axId val="289529984"/>
+        <c:axId val="500811192"/>
+        <c:axId val="500807272"/>
         <c:extLst xmlns:c16r2="http://schemas.microsoft.com/office/drawing/2015/06/chart">
           <c:ext xmlns:c15="http://schemas.microsoft.com/office/drawing/2012/chart" uri="{02D57815-91ED-43cb-92C2-25804820EDAC}">
             <c15:filteredScatterSeries>
@@ -2645,7 +2645,7 @@
         </c:extLst>
       </c:scatterChart>
       <c:valAx>
-        <c:axId val="289533904"/>
+        <c:axId val="500811192"/>
         <c:scaling>
           <c:orientation val="minMax"/>
           <c:max val="432.5"/>
@@ -2751,13 +2751,13 @@
             <a:endParaRPr lang="fr-FR"/>
           </a:p>
         </c:txPr>
-        <c:crossAx val="289529984"/>
+        <c:crossAx val="500807272"/>
         <c:crosses val="autoZero"/>
         <c:crossBetween val="midCat"/>
         <c:majorUnit val="25"/>
       </c:valAx>
       <c:valAx>
-        <c:axId val="289529984"/>
+        <c:axId val="500807272"/>
         <c:scaling>
           <c:orientation val="minMax"/>
         </c:scaling>
@@ -2869,7 +2869,7 @@
             <a:endParaRPr lang="fr-FR"/>
           </a:p>
         </c:txPr>
-        <c:crossAx val="289533904"/>
+        <c:crossAx val="500811192"/>
         <c:crosses val="autoZero"/>
         <c:crossBetween val="midCat"/>
       </c:valAx>
@@ -3317,8 +3317,8 @@
           <c:showPercent val="0"/>
           <c:showBubbleSize val="0"/>
         </c:dLbls>
-        <c:axId val="290517016"/>
-        <c:axId val="290522504"/>
+        <c:axId val="500808448"/>
+        <c:axId val="500812368"/>
         <c:extLst xmlns:c16r2="http://schemas.microsoft.com/office/drawing/2015/06/chart">
           <c:ext xmlns:c15="http://schemas.microsoft.com/office/drawing/2012/chart" uri="{02D57815-91ED-43cb-92C2-25804820EDAC}">
             <c15:filteredScatterSeries>
@@ -3586,7 +3586,7 @@
         </c:extLst>
       </c:scatterChart>
       <c:valAx>
-        <c:axId val="290517016"/>
+        <c:axId val="500808448"/>
         <c:scaling>
           <c:orientation val="minMax"/>
           <c:max val="432.5"/>
@@ -3692,13 +3692,13 @@
             <a:endParaRPr lang="fr-FR"/>
           </a:p>
         </c:txPr>
-        <c:crossAx val="290522504"/>
+        <c:crossAx val="500812368"/>
         <c:crosses val="autoZero"/>
         <c:crossBetween val="midCat"/>
         <c:majorUnit val="25"/>
       </c:valAx>
       <c:valAx>
-        <c:axId val="290522504"/>
+        <c:axId val="500812368"/>
         <c:scaling>
           <c:orientation val="minMax"/>
           <c:max val="70"/>
@@ -3804,7 +3804,7 @@
             <a:endParaRPr lang="fr-FR"/>
           </a:p>
         </c:txPr>
-        <c:crossAx val="290517016"/>
+        <c:crossAx val="500808448"/>
         <c:crosses val="autoZero"/>
         <c:crossBetween val="midCat"/>
       </c:valAx>
@@ -4259,8 +4259,8 @@
           <c:showPercent val="0"/>
           <c:showBubbleSize val="0"/>
         </c:dLbls>
-        <c:axId val="287677392"/>
-        <c:axId val="287674648"/>
+        <c:axId val="183682752"/>
+        <c:axId val="183681576"/>
         <c:extLst xmlns:c16r2="http://schemas.microsoft.com/office/drawing/2015/06/chart">
           <c:ext xmlns:c15="http://schemas.microsoft.com/office/drawing/2012/chart" uri="{02D57815-91ED-43cb-92C2-25804820EDAC}">
             <c15:filteredScatterSeries>
@@ -4528,7 +4528,7 @@
         </c:extLst>
       </c:scatterChart>
       <c:valAx>
-        <c:axId val="287677392"/>
+        <c:axId val="183682752"/>
         <c:scaling>
           <c:orientation val="minMax"/>
           <c:max val="252.5"/>
@@ -4578,7 +4578,6 @@
               </a:p>
             </c:rich>
           </c:tx>
-          <c:layout/>
           <c:overlay val="0"/>
           <c:spPr>
             <a:noFill/>
@@ -4639,13 +4638,13 @@
             <a:endParaRPr lang="fr-FR"/>
           </a:p>
         </c:txPr>
-        <c:crossAx val="287674648"/>
+        <c:crossAx val="183681576"/>
         <c:crosses val="autoZero"/>
         <c:crossBetween val="midCat"/>
         <c:majorUnit val="25"/>
       </c:valAx>
       <c:valAx>
-        <c:axId val="287674648"/>
+        <c:axId val="183681576"/>
         <c:scaling>
           <c:orientation val="minMax"/>
         </c:scaling>
@@ -4701,7 +4700,6 @@
               </a:p>
             </c:rich>
           </c:tx>
-          <c:layout/>
           <c:overlay val="0"/>
           <c:spPr>
             <a:noFill/>
@@ -4762,7 +4760,7 @@
             <a:endParaRPr lang="fr-FR"/>
           </a:p>
         </c:txPr>
-        <c:crossAx val="287677392"/>
+        <c:crossAx val="183682752"/>
         <c:crosses val="autoZero"/>
         <c:crossBetween val="midCat"/>
       </c:valAx>
@@ -5198,8 +5196,8 @@
           <c:showPercent val="0"/>
           <c:showBubbleSize val="0"/>
         </c:dLbls>
-        <c:axId val="287675040"/>
-        <c:axId val="287681312"/>
+        <c:axId val="178316536"/>
+        <c:axId val="178317320"/>
         <c:extLst xmlns:c16r2="http://schemas.microsoft.com/office/drawing/2015/06/chart">
           <c:ext xmlns:c15="http://schemas.microsoft.com/office/drawing/2012/chart" uri="{02D57815-91ED-43cb-92C2-25804820EDAC}">
             <c15:filteredScatterSeries>
@@ -5467,7 +5465,7 @@
         </c:extLst>
       </c:scatterChart>
       <c:valAx>
-        <c:axId val="287675040"/>
+        <c:axId val="178316536"/>
         <c:scaling>
           <c:orientation val="minMax"/>
           <c:max val="432.5"/>
@@ -5573,13 +5571,13 @@
             <a:endParaRPr lang="fr-FR"/>
           </a:p>
         </c:txPr>
-        <c:crossAx val="287681312"/>
+        <c:crossAx val="178317320"/>
         <c:crosses val="autoZero"/>
         <c:crossBetween val="midCat"/>
         <c:majorUnit val="25"/>
       </c:valAx>
       <c:valAx>
-        <c:axId val="287681312"/>
+        <c:axId val="178317320"/>
         <c:scaling>
           <c:orientation val="minMax"/>
         </c:scaling>
@@ -5682,7 +5680,7 @@
             <a:endParaRPr lang="fr-FR"/>
           </a:p>
         </c:txPr>
-        <c:crossAx val="287675040"/>
+        <c:crossAx val="178316536"/>
         <c:crosses val="autoZero"/>
         <c:crossBetween val="midCat"/>
         <c:majorUnit val="3.0000000000000006E-2"/>
@@ -6137,8 +6135,8 @@
           <c:showPercent val="0"/>
           <c:showBubbleSize val="0"/>
         </c:dLbls>
-        <c:axId val="287675432"/>
-        <c:axId val="287676216"/>
+        <c:axId val="496716744"/>
+        <c:axId val="496713216"/>
         <c:extLst xmlns:c16r2="http://schemas.microsoft.com/office/drawing/2015/06/chart">
           <c:ext xmlns:c15="http://schemas.microsoft.com/office/drawing/2012/chart" uri="{02D57815-91ED-43cb-92C2-25804820EDAC}">
             <c15:filteredScatterSeries>
@@ -6406,7 +6404,7 @@
         </c:extLst>
       </c:scatterChart>
       <c:valAx>
-        <c:axId val="287675432"/>
+        <c:axId val="496716744"/>
         <c:scaling>
           <c:orientation val="minMax"/>
           <c:max val="432.5"/>
@@ -6520,13 +6518,13 @@
             <a:endParaRPr lang="fr-FR"/>
           </a:p>
         </c:txPr>
-        <c:crossAx val="287676216"/>
+        <c:crossAx val="496713216"/>
         <c:crosses val="autoZero"/>
         <c:crossBetween val="midCat"/>
         <c:majorUnit val="25"/>
       </c:valAx>
       <c:valAx>
-        <c:axId val="287676216"/>
+        <c:axId val="496713216"/>
         <c:scaling>
           <c:orientation val="minMax"/>
           <c:max val="50"/>
@@ -6631,7 +6629,7 @@
             <a:endParaRPr lang="fr-FR"/>
           </a:p>
         </c:txPr>
-        <c:crossAx val="287675432"/>
+        <c:crossAx val="496716744"/>
         <c:crosses val="autoZero"/>
         <c:crossBetween val="midCat"/>
       </c:valAx>
@@ -7079,8 +7077,8 @@
           <c:showPercent val="0"/>
           <c:showBubbleSize val="0"/>
         </c:dLbls>
-        <c:axId val="287681704"/>
-        <c:axId val="288329984"/>
+        <c:axId val="496717136"/>
+        <c:axId val="496715960"/>
         <c:extLst xmlns:c16r2="http://schemas.microsoft.com/office/drawing/2015/06/chart">
           <c:ext xmlns:c15="http://schemas.microsoft.com/office/drawing/2012/chart" uri="{02D57815-91ED-43cb-92C2-25804820EDAC}">
             <c15:filteredScatterSeries>
@@ -7348,7 +7346,7 @@
         </c:extLst>
       </c:scatterChart>
       <c:valAx>
-        <c:axId val="287681704"/>
+        <c:axId val="496717136"/>
         <c:scaling>
           <c:orientation val="minMax"/>
           <c:max val="252.5"/>
@@ -7454,13 +7452,13 @@
             <a:endParaRPr lang="fr-FR"/>
           </a:p>
         </c:txPr>
-        <c:crossAx val="288329984"/>
+        <c:crossAx val="496715960"/>
         <c:crosses val="autoZero"/>
         <c:crossBetween val="midCat"/>
         <c:majorUnit val="25"/>
       </c:valAx>
       <c:valAx>
-        <c:axId val="288329984"/>
+        <c:axId val="496715960"/>
         <c:scaling>
           <c:orientation val="minMax"/>
           <c:max val="70"/>
@@ -7566,7 +7564,7 @@
             <a:endParaRPr lang="fr-FR"/>
           </a:p>
         </c:txPr>
-        <c:crossAx val="287681704"/>
+        <c:crossAx val="496717136"/>
         <c:crosses val="autoZero"/>
         <c:crossBetween val="midCat"/>
       </c:valAx>
@@ -8020,8 +8018,8 @@
           <c:showPercent val="0"/>
           <c:showBubbleSize val="0"/>
         </c:dLbls>
-        <c:axId val="288328024"/>
-        <c:axId val="288326456"/>
+        <c:axId val="496718704"/>
+        <c:axId val="496717528"/>
         <c:extLst xmlns:c16r2="http://schemas.microsoft.com/office/drawing/2015/06/chart">
           <c:ext xmlns:c15="http://schemas.microsoft.com/office/drawing/2012/chart" uri="{02D57815-91ED-43cb-92C2-25804820EDAC}">
             <c15:filteredScatterSeries>
@@ -8289,7 +8287,7 @@
         </c:extLst>
       </c:scatterChart>
       <c:valAx>
-        <c:axId val="288328024"/>
+        <c:axId val="496718704"/>
         <c:scaling>
           <c:orientation val="minMax"/>
           <c:max val="252.5"/>
@@ -8395,13 +8393,13 @@
             <a:endParaRPr lang="fr-FR"/>
           </a:p>
         </c:txPr>
-        <c:crossAx val="288326456"/>
+        <c:crossAx val="496717528"/>
         <c:crosses val="autoZero"/>
         <c:crossBetween val="midCat"/>
         <c:majorUnit val="25"/>
       </c:valAx>
       <c:valAx>
-        <c:axId val="288326456"/>
+        <c:axId val="496717528"/>
         <c:scaling>
           <c:orientation val="minMax"/>
         </c:scaling>
@@ -8521,7 +8519,7 @@
             <a:endParaRPr lang="fr-FR"/>
           </a:p>
         </c:txPr>
-        <c:crossAx val="288328024"/>
+        <c:crossAx val="496718704"/>
         <c:crosses val="autoZero"/>
         <c:crossBetween val="midCat"/>
       </c:valAx>
@@ -8969,8 +8967,8 @@
           <c:showPercent val="0"/>
           <c:showBubbleSize val="0"/>
         </c:dLbls>
-        <c:axId val="288328808"/>
-        <c:axId val="288332336"/>
+        <c:axId val="499390136"/>
+        <c:axId val="499385040"/>
         <c:extLst xmlns:c16r2="http://schemas.microsoft.com/office/drawing/2015/06/chart">
           <c:ext xmlns:c15="http://schemas.microsoft.com/office/drawing/2012/chart" uri="{02D57815-91ED-43cb-92C2-25804820EDAC}">
             <c15:filteredScatterSeries>
@@ -9238,7 +9236,7 @@
         </c:extLst>
       </c:scatterChart>
       <c:valAx>
-        <c:axId val="288328808"/>
+        <c:axId val="499390136"/>
         <c:scaling>
           <c:orientation val="minMax"/>
           <c:max val="432.5"/>
@@ -9348,13 +9346,13 @@
             <a:endParaRPr lang="fr-FR"/>
           </a:p>
         </c:txPr>
-        <c:crossAx val="288332336"/>
+        <c:crossAx val="499385040"/>
         <c:crosses val="autoZero"/>
         <c:crossBetween val="midCat"/>
         <c:majorUnit val="25"/>
       </c:valAx>
       <c:valAx>
-        <c:axId val="288332336"/>
+        <c:axId val="499385040"/>
         <c:scaling>
           <c:orientation val="minMax"/>
           <c:max val="70"/>
@@ -9460,7 +9458,7 @@
             <a:endParaRPr lang="fr-FR"/>
           </a:p>
         </c:txPr>
-        <c:crossAx val="288328808"/>
+        <c:crossAx val="499390136"/>
         <c:crosses val="autoZero"/>
         <c:crossBetween val="midCat"/>
       </c:valAx>
@@ -9896,8 +9894,8 @@
           <c:showPercent val="0"/>
           <c:showBubbleSize val="0"/>
         </c:dLbls>
-        <c:axId val="288329200"/>
-        <c:axId val="288329592"/>
+        <c:axId val="499385432"/>
+        <c:axId val="499390528"/>
         <c:extLst xmlns:c16r2="http://schemas.microsoft.com/office/drawing/2015/06/chart">
           <c:ext xmlns:c15="http://schemas.microsoft.com/office/drawing/2012/chart" uri="{02D57815-91ED-43cb-92C2-25804820EDAC}">
             <c15:filteredScatterSeries>
@@ -10165,7 +10163,7 @@
         </c:extLst>
       </c:scatterChart>
       <c:valAx>
-        <c:axId val="288329200"/>
+        <c:axId val="499385432"/>
         <c:scaling>
           <c:orientation val="minMax"/>
           <c:max val="432.5"/>
@@ -10279,13 +10277,13 @@
             <a:endParaRPr lang="fr-FR"/>
           </a:p>
         </c:txPr>
-        <c:crossAx val="288329592"/>
+        <c:crossAx val="499390528"/>
         <c:crosses val="autoZero"/>
         <c:crossBetween val="midCat"/>
         <c:majorUnit val="25"/>
       </c:valAx>
       <c:valAx>
-        <c:axId val="288329592"/>
+        <c:axId val="499390528"/>
         <c:scaling>
           <c:orientation val="minMax"/>
         </c:scaling>
@@ -10405,7 +10403,7 @@
             <a:endParaRPr lang="fr-FR"/>
           </a:p>
         </c:txPr>
-        <c:crossAx val="288329200"/>
+        <c:crossAx val="499385432"/>
         <c:crosses val="autoZero"/>
         <c:crossBetween val="midCat"/>
       </c:valAx>
@@ -10853,8 +10851,8 @@
           <c:showPercent val="0"/>
           <c:showBubbleSize val="0"/>
         </c:dLbls>
-        <c:axId val="287677784"/>
-        <c:axId val="289535864"/>
+        <c:axId val="499390920"/>
+        <c:axId val="499385824"/>
         <c:extLst xmlns:c16r2="http://schemas.microsoft.com/office/drawing/2015/06/chart">
           <c:ext xmlns:c15="http://schemas.microsoft.com/office/drawing/2012/chart" uri="{02D57815-91ED-43cb-92C2-25804820EDAC}">
             <c15:filteredScatterSeries>
@@ -11122,7 +11120,7 @@
         </c:extLst>
       </c:scatterChart>
       <c:valAx>
-        <c:axId val="287677784"/>
+        <c:axId val="499390920"/>
         <c:scaling>
           <c:orientation val="minMax"/>
           <c:max val="252.5"/>
@@ -11228,13 +11226,13 @@
             <a:endParaRPr lang="fr-FR"/>
           </a:p>
         </c:txPr>
-        <c:crossAx val="289535864"/>
+        <c:crossAx val="499385824"/>
         <c:crosses val="autoZero"/>
         <c:crossBetween val="midCat"/>
         <c:majorUnit val="25"/>
       </c:valAx>
       <c:valAx>
-        <c:axId val="289535864"/>
+        <c:axId val="499385824"/>
         <c:scaling>
           <c:orientation val="minMax"/>
           <c:max val="70"/>
@@ -11340,7 +11338,7 @@
             <a:endParaRPr lang="fr-FR"/>
           </a:p>
         </c:txPr>
-        <c:crossAx val="287677784"/>
+        <c:crossAx val="499390920"/>
         <c:crosses val="autoZero"/>
         <c:crossBetween val="midCat"/>
       </c:valAx>
@@ -18228,7 +18226,7 @@
           <a:p>
             <a:fld id="{202E84C4-7C53-474A-BFA3-0C91E41EF858}" type="datetimeFigureOut">
               <a:rPr lang="fr-FR" smtClean="0"/>
-              <a:t>08/01/2019</a:t>
+              <a:t>14/01/2019</a:t>
             </a:fld>
             <a:endParaRPr lang="fr-FR"/>
           </a:p>
@@ -18398,7 +18396,7 @@
           <a:p>
             <a:fld id="{202E84C4-7C53-474A-BFA3-0C91E41EF858}" type="datetimeFigureOut">
               <a:rPr lang="fr-FR" smtClean="0"/>
-              <a:t>08/01/2019</a:t>
+              <a:t>14/01/2019</a:t>
             </a:fld>
             <a:endParaRPr lang="fr-FR"/>
           </a:p>
@@ -18578,7 +18576,7 @@
           <a:p>
             <a:fld id="{202E84C4-7C53-474A-BFA3-0C91E41EF858}" type="datetimeFigureOut">
               <a:rPr lang="fr-FR" smtClean="0"/>
-              <a:t>08/01/2019</a:t>
+              <a:t>14/01/2019</a:t>
             </a:fld>
             <a:endParaRPr lang="fr-FR"/>
           </a:p>
@@ -18748,7 +18746,7 @@
           <a:p>
             <a:fld id="{202E84C4-7C53-474A-BFA3-0C91E41EF858}" type="datetimeFigureOut">
               <a:rPr lang="fr-FR" smtClean="0"/>
-              <a:t>08/01/2019</a:t>
+              <a:t>14/01/2019</a:t>
             </a:fld>
             <a:endParaRPr lang="fr-FR"/>
           </a:p>
@@ -18994,7 +18992,7 @@
           <a:p>
             <a:fld id="{202E84C4-7C53-474A-BFA3-0C91E41EF858}" type="datetimeFigureOut">
               <a:rPr lang="fr-FR" smtClean="0"/>
-              <a:t>08/01/2019</a:t>
+              <a:t>14/01/2019</a:t>
             </a:fld>
             <a:endParaRPr lang="fr-FR"/>
           </a:p>
@@ -19226,7 +19224,7 @@
           <a:p>
             <a:fld id="{202E84C4-7C53-474A-BFA3-0C91E41EF858}" type="datetimeFigureOut">
               <a:rPr lang="fr-FR" smtClean="0"/>
-              <a:t>08/01/2019</a:t>
+              <a:t>14/01/2019</a:t>
             </a:fld>
             <a:endParaRPr lang="fr-FR"/>
           </a:p>
@@ -19593,7 +19591,7 @@
           <a:p>
             <a:fld id="{202E84C4-7C53-474A-BFA3-0C91E41EF858}" type="datetimeFigureOut">
               <a:rPr lang="fr-FR" smtClean="0"/>
-              <a:t>08/01/2019</a:t>
+              <a:t>14/01/2019</a:t>
             </a:fld>
             <a:endParaRPr lang="fr-FR"/>
           </a:p>
@@ -19711,7 +19709,7 @@
           <a:p>
             <a:fld id="{202E84C4-7C53-474A-BFA3-0C91E41EF858}" type="datetimeFigureOut">
               <a:rPr lang="fr-FR" smtClean="0"/>
-              <a:t>08/01/2019</a:t>
+              <a:t>14/01/2019</a:t>
             </a:fld>
             <a:endParaRPr lang="fr-FR"/>
           </a:p>
@@ -19806,7 +19804,7 @@
           <a:p>
             <a:fld id="{202E84C4-7C53-474A-BFA3-0C91E41EF858}" type="datetimeFigureOut">
               <a:rPr lang="fr-FR" smtClean="0"/>
-              <a:t>08/01/2019</a:t>
+              <a:t>14/01/2019</a:t>
             </a:fld>
             <a:endParaRPr lang="fr-FR"/>
           </a:p>
@@ -20083,7 +20081,7 @@
           <a:p>
             <a:fld id="{202E84C4-7C53-474A-BFA3-0C91E41EF858}" type="datetimeFigureOut">
               <a:rPr lang="fr-FR" smtClean="0"/>
-              <a:t>08/01/2019</a:t>
+              <a:t>14/01/2019</a:t>
             </a:fld>
             <a:endParaRPr lang="fr-FR"/>
           </a:p>
@@ -20336,7 +20334,7 @@
           <a:p>
             <a:fld id="{202E84C4-7C53-474A-BFA3-0C91E41EF858}" type="datetimeFigureOut">
               <a:rPr lang="fr-FR" smtClean="0"/>
-              <a:t>08/01/2019</a:t>
+              <a:t>14/01/2019</a:t>
             </a:fld>
             <a:endParaRPr lang="fr-FR"/>
           </a:p>
@@ -20549,7 +20547,7 @@
           <a:p>
             <a:fld id="{202E84C4-7C53-474A-BFA3-0C91E41EF858}" type="datetimeFigureOut">
               <a:rPr lang="fr-FR" smtClean="0"/>
-              <a:t>08/01/2019</a:t>
+              <a:t>14/01/2019</a:t>
             </a:fld>
             <a:endParaRPr lang="fr-FR"/>
           </a:p>
@@ -20962,10 +20960,10 @@
         </p:nvGrpSpPr>
         <p:grpSpPr>
           <a:xfrm>
-            <a:off x="4284324" y="619072"/>
-            <a:ext cx="5289809" cy="5404232"/>
-            <a:chOff x="4284324" y="619072"/>
-            <a:chExt cx="5289809" cy="5404232"/>
+            <a:off x="4828854" y="1044375"/>
+            <a:ext cx="4745279" cy="5068455"/>
+            <a:chOff x="4828854" y="1044375"/>
+            <a:chExt cx="4745279" cy="5068455"/>
           </a:xfrm>
         </p:grpSpPr>
         <p:grpSp>
@@ -20976,10 +20974,10 @@
           </p:nvGrpSpPr>
           <p:grpSpPr>
             <a:xfrm>
-              <a:off x="4284324" y="770562"/>
-              <a:ext cx="5289809" cy="5252742"/>
-              <a:chOff x="4284324" y="770562"/>
-              <a:chExt cx="5289809" cy="5252742"/>
+              <a:off x="4828854" y="1304818"/>
+              <a:ext cx="4745279" cy="4808012"/>
+              <a:chOff x="4828854" y="1304818"/>
+              <a:chExt cx="4745279" cy="4808012"/>
             </a:xfrm>
           </p:grpSpPr>
           <p:grpSp>
@@ -20990,10 +20988,10 @@
             </p:nvGrpSpPr>
             <p:grpSpPr>
               <a:xfrm>
-                <a:off x="4284324" y="770562"/>
-                <a:ext cx="5289809" cy="5252742"/>
-                <a:chOff x="4284324" y="770562"/>
-                <a:chExt cx="5289809" cy="5252742"/>
+                <a:off x="4828854" y="1304818"/>
+                <a:ext cx="4745279" cy="4808012"/>
+                <a:chOff x="4828854" y="1304818"/>
+                <a:chExt cx="4745279" cy="4808012"/>
               </a:xfrm>
             </p:grpSpPr>
             <p:grpSp>
@@ -21004,10 +21002,10 @@
               </p:nvGrpSpPr>
               <p:grpSpPr>
                 <a:xfrm>
-                  <a:off x="4284324" y="770562"/>
-                  <a:ext cx="5289809" cy="5252742"/>
-                  <a:chOff x="2719062" y="831289"/>
-                  <a:chExt cx="4655689" cy="4559978"/>
+                  <a:off x="4828854" y="1304818"/>
+                  <a:ext cx="4745279" cy="4808012"/>
+                  <a:chOff x="3198316" y="1295084"/>
+                  <a:chExt cx="4176435" cy="4173902"/>
                 </a:xfrm>
               </p:grpSpPr>
               <p:sp>
@@ -21018,8 +21016,8 @@
                 </p:nvSpPr>
                 <p:spPr>
                   <a:xfrm>
-                    <a:off x="3270655" y="1366438"/>
-                    <a:ext cx="3240000" cy="3240000"/>
+                    <a:off x="3532890" y="1605178"/>
+                    <a:ext cx="2977766" cy="3001260"/>
                   </a:xfrm>
                   <a:prstGeom prst="ellipse">
                     <a:avLst/>
@@ -21066,8 +21064,8 @@
                 </p:nvCxnSpPr>
                 <p:spPr>
                   <a:xfrm flipH="1">
-                    <a:off x="2719062" y="2986478"/>
-                    <a:ext cx="4259546" cy="0"/>
+                    <a:off x="3198316" y="2986478"/>
+                    <a:ext cx="3780292" cy="0"/>
                   </a:xfrm>
                   <a:prstGeom prst="line">
                     <a:avLst/>
@@ -21105,7 +21103,7 @@
                 <p:spPr>
                   <a:xfrm>
                     <a:off x="5646559" y="1605178"/>
-                    <a:ext cx="1728192" cy="323059"/>
+                    <a:ext cx="1728192" cy="400778"/>
                   </a:xfrm>
                   <a:prstGeom prst="rect">
                     <a:avLst/>
@@ -21120,10 +21118,10 @@
                   <a:p>
                     <a:pPr algn="ctr"/>
                     <a:r>
-                      <a:rPr lang="fr-FR" dirty="0" smtClean="0"/>
+                      <a:rPr lang="fr-FR" sz="2400" dirty="0" smtClean="0"/>
                       <a:t>Coussinet</a:t>
                     </a:r>
-                    <a:endParaRPr lang="fr-FR" dirty="0"/>
+                    <a:endParaRPr lang="fr-FR" sz="2400" dirty="0"/>
                   </a:p>
                 </p:txBody>
               </p:sp>
@@ -21135,8 +21133,8 @@
                 </p:nvCxnSpPr>
                 <p:spPr>
                   <a:xfrm>
-                    <a:off x="4872837" y="831289"/>
-                    <a:ext cx="0" cy="4315149"/>
+                    <a:off x="4872837" y="1295084"/>
+                    <a:ext cx="0" cy="3851354"/>
                   </a:xfrm>
                   <a:prstGeom prst="line">
                     <a:avLst/>
@@ -21165,8 +21163,8 @@
                   </a:fontRef>
                 </p:style>
               </p:cxnSp>
-              <mc:AlternateContent xmlns:mc="http://schemas.openxmlformats.org/markup-compatibility/2006" xmlns:a14="http://schemas.microsoft.com/office/drawing/2010/main">
-                <mc:Choice Requires="a14">
+              <mc:AlternateContent xmlns:mc="http://schemas.openxmlformats.org/markup-compatibility/2006">
+                <mc:Choice xmlns:a14="http://schemas.microsoft.com/office/drawing/2010/main" Requires="a14">
                   <p:sp>
                     <p:nvSpPr>
                       <p:cNvPr id="51" name="ZoneTexte 50"/>
@@ -21176,7 +21174,7 @@
                     <p:spPr>
                       <a:xfrm>
                         <a:off x="4782463" y="5068208"/>
-                        <a:ext cx="340167" cy="323059"/>
+                        <a:ext cx="404742" cy="400778"/>
                       </a:xfrm>
                       <a:prstGeom prst="rect">
                         <a:avLst/>
@@ -21197,7 +21195,7 @@
                             </m:oMathParaPr>
                             <m:oMath xmlns:m="http://schemas.openxmlformats.org/officeDocument/2006/math">
                               <m:r>
-                                <a:rPr lang="fr-FR" i="1" dirty="0" smtClean="0">
+                                <a:rPr lang="fr-FR" sz="2400" i="1" dirty="0" smtClean="0">
                                   <a:latin typeface="Cambria Math" panose="02040503050406030204" pitchFamily="18" charset="0"/>
                                 </a:rPr>
                                 <m:t>𝑋</m:t>
@@ -21205,12 +21203,12 @@
                             </m:oMath>
                           </m:oMathPara>
                         </a14:m>
-                        <a:endParaRPr lang="fr-FR" dirty="0"/>
+                        <a:endParaRPr lang="fr-FR" sz="2400" dirty="0"/>
                       </a:p>
                     </p:txBody>
                   </p:sp>
                 </mc:Choice>
-                <mc:Fallback xmlns="">
+                <mc:Fallback>
                   <p:sp>
                     <p:nvSpPr>
                       <p:cNvPr id="51" name="ZoneTexte 50"/>
@@ -21222,7 +21220,7 @@
                     <p:spPr>
                       <a:xfrm>
                         <a:off x="4782463" y="5068208"/>
-                        <a:ext cx="340167" cy="323059"/>
+                        <a:ext cx="404742" cy="400778"/>
                       </a:xfrm>
                       <a:prstGeom prst="rect">
                         <a:avLst/>
@@ -21249,8 +21247,8 @@
                   </p:sp>
                 </mc:Fallback>
               </mc:AlternateContent>
-              <mc:AlternateContent xmlns:mc="http://schemas.openxmlformats.org/markup-compatibility/2006" xmlns:a14="http://schemas.microsoft.com/office/drawing/2010/main">
-                <mc:Choice Requires="a14">
+              <mc:AlternateContent xmlns:mc="http://schemas.openxmlformats.org/markup-compatibility/2006">
+                <mc:Choice xmlns:a14="http://schemas.microsoft.com/office/drawing/2010/main" Requires="a14">
                   <p:sp>
                     <p:nvSpPr>
                       <p:cNvPr id="52" name="ZoneTexte 51"/>
@@ -21260,7 +21258,7 @@
                     <p:spPr>
                       <a:xfrm>
                         <a:off x="6947505" y="2765772"/>
-                        <a:ext cx="331827" cy="323059"/>
+                        <a:ext cx="393455" cy="400778"/>
                       </a:xfrm>
                       <a:prstGeom prst="rect">
                         <a:avLst/>
@@ -21281,7 +21279,7 @@
                             </m:oMathParaPr>
                             <m:oMath xmlns:m="http://schemas.openxmlformats.org/officeDocument/2006/math">
                               <m:r>
-                                <a:rPr lang="fr-FR" b="0" i="1" smtClean="0">
+                                <a:rPr lang="fr-FR" sz="2400" b="0" i="1" smtClean="0">
                                   <a:latin typeface="Cambria Math" panose="02040503050406030204" pitchFamily="18" charset="0"/>
                                 </a:rPr>
                                 <m:t>𝑌</m:t>
@@ -21289,12 +21287,12 @@
                             </m:oMath>
                           </m:oMathPara>
                         </a14:m>
-                        <a:endParaRPr lang="fr-FR" dirty="0"/>
+                        <a:endParaRPr lang="fr-FR" sz="2400" dirty="0"/>
                       </a:p>
                     </p:txBody>
                   </p:sp>
                 </mc:Choice>
-                <mc:Fallback xmlns="">
+                <mc:Fallback>
                   <p:sp>
                     <p:nvSpPr>
                       <p:cNvPr id="52" name="ZoneTexte 51"/>
@@ -21306,7 +21304,7 @@
                     <p:spPr>
                       <a:xfrm>
                         <a:off x="6947505" y="2765772"/>
-                        <a:ext cx="331827" cy="323059"/>
+                        <a:ext cx="393455" cy="400778"/>
                       </a:xfrm>
                       <a:prstGeom prst="rect">
                         <a:avLst/>
@@ -21400,8 +21398,8 @@
                 </a:fontRef>
               </p:style>
             </p:cxnSp>
-            <mc:AlternateContent xmlns:mc="http://schemas.openxmlformats.org/markup-compatibility/2006" xmlns:a14="http://schemas.microsoft.com/office/drawing/2010/main">
-              <mc:Choice Requires="a14">
+            <mc:AlternateContent xmlns:mc="http://schemas.openxmlformats.org/markup-compatibility/2006">
+              <mc:Choice xmlns:a14="http://schemas.microsoft.com/office/drawing/2010/main" Requires="a14">
                 <p:sp>
                   <p:nvSpPr>
                     <p:cNvPr id="61" name="ZoneTexte 60"/>
@@ -21410,8 +21408,8 @@
                   </p:nvSpPr>
                   <p:spPr>
                     <a:xfrm>
-                      <a:off x="6849849" y="3738560"/>
-                      <a:ext cx="463396" cy="369332"/>
+                      <a:off x="7186803" y="3243011"/>
+                      <a:ext cx="552587" cy="461665"/>
                     </a:xfrm>
                     <a:prstGeom prst="rect">
                       <a:avLst/>
@@ -21434,14 +21432,14 @@
                             <m:sSub>
                               <m:sSubPr>
                                 <m:ctrlPr>
-                                  <a:rPr lang="fr-FR" b="0" i="1" dirty="0" smtClean="0">
+                                  <a:rPr lang="fr-FR" sz="2400" b="0" i="1" dirty="0" smtClean="0">
                                     <a:latin typeface="Cambria Math" panose="02040503050406030204" pitchFamily="18" charset="0"/>
                                   </a:rPr>
                                 </m:ctrlPr>
                               </m:sSubPr>
                               <m:e>
                                 <m:r>
-                                  <a:rPr lang="fr-FR" i="1" dirty="0" smtClean="0">
+                                  <a:rPr lang="fr-FR" sz="2400" i="1" dirty="0" smtClean="0">
                                     <a:latin typeface="Cambria Math" panose="02040503050406030204" pitchFamily="18" charset="0"/>
                                   </a:rPr>
                                   <m:t>𝑥</m:t>
@@ -21449,7 +21447,7 @@
                               </m:e>
                               <m:sub>
                                 <m:r>
-                                  <a:rPr lang="fr-FR" b="0" i="1" dirty="0" smtClean="0">
+                                  <a:rPr lang="fr-FR" sz="2400" b="0" i="1" dirty="0" smtClean="0">
                                     <a:latin typeface="Cambria Math" panose="02040503050406030204" pitchFamily="18" charset="0"/>
                                   </a:rPr>
                                   <m:t>𝑟</m:t>
@@ -21459,12 +21457,12 @@
                           </m:oMath>
                         </m:oMathPara>
                       </a14:m>
-                      <a:endParaRPr lang="fr-FR" dirty="0"/>
+                      <a:endParaRPr lang="fr-FR" sz="2400" dirty="0"/>
                     </a:p>
                   </p:txBody>
                 </p:sp>
               </mc:Choice>
-              <mc:Fallback xmlns="">
+              <mc:Fallback>
                 <p:sp>
                   <p:nvSpPr>
                     <p:cNvPr id="61" name="ZoneTexte 60"/>
@@ -21475,8 +21473,8 @@
                   </p:nvSpPr>
                   <p:spPr>
                     <a:xfrm>
-                      <a:off x="6849849" y="3738560"/>
-                      <a:ext cx="463396" cy="369332"/>
+                      <a:off x="7186803" y="3243011"/>
+                      <a:ext cx="552587" cy="461665"/>
                     </a:xfrm>
                     <a:prstGeom prst="rect">
                       <a:avLst/>
@@ -21503,8 +21501,8 @@
                 </p:sp>
               </mc:Fallback>
             </mc:AlternateContent>
-            <mc:AlternateContent xmlns:mc="http://schemas.openxmlformats.org/markup-compatibility/2006" xmlns:a14="http://schemas.microsoft.com/office/drawing/2010/main">
-              <mc:Choice Requires="a14">
+            <mc:AlternateContent xmlns:mc="http://schemas.openxmlformats.org/markup-compatibility/2006">
+              <mc:Choice xmlns:a14="http://schemas.microsoft.com/office/drawing/2010/main" Requires="a14">
                 <p:sp>
                   <p:nvSpPr>
                     <p:cNvPr id="62" name="ZoneTexte 61"/>
@@ -21513,8 +21511,8 @@
                   </p:nvSpPr>
                   <p:spPr>
                     <a:xfrm>
-                      <a:off x="7258834" y="3316207"/>
-                      <a:ext cx="451790" cy="369332"/>
+                      <a:off x="6724803" y="3704901"/>
+                      <a:ext cx="536557" cy="461665"/>
                     </a:xfrm>
                     <a:prstGeom prst="rect">
                       <a:avLst/>
@@ -21537,14 +21535,14 @@
                             <m:sSub>
                               <m:sSubPr>
                                 <m:ctrlPr>
-                                  <a:rPr lang="fr-FR" b="0" i="1" dirty="0" smtClean="0">
+                                  <a:rPr lang="fr-FR" sz="2400" b="0" i="1" dirty="0" smtClean="0">
                                     <a:latin typeface="Cambria Math" panose="02040503050406030204" pitchFamily="18" charset="0"/>
                                   </a:rPr>
                                 </m:ctrlPr>
                               </m:sSubPr>
                               <m:e>
                                 <m:r>
-                                  <a:rPr lang="fr-FR" b="0" i="1" dirty="0" smtClean="0">
+                                  <a:rPr lang="fr-FR" sz="2400" b="0" i="1" dirty="0" smtClean="0">
                                     <a:latin typeface="Cambria Math" panose="02040503050406030204" pitchFamily="18" charset="0"/>
                                   </a:rPr>
                                   <m:t>𝑦</m:t>
@@ -21552,7 +21550,7 @@
                               </m:e>
                               <m:sub>
                                 <m:r>
-                                  <a:rPr lang="fr-FR" b="0" i="1" dirty="0" smtClean="0">
+                                  <a:rPr lang="fr-FR" sz="2400" b="0" i="1" dirty="0" smtClean="0">
                                     <a:latin typeface="Cambria Math" panose="02040503050406030204" pitchFamily="18" charset="0"/>
                                   </a:rPr>
                                   <m:t>𝑟</m:t>
@@ -21562,12 +21560,12 @@
                           </m:oMath>
                         </m:oMathPara>
                       </a14:m>
-                      <a:endParaRPr lang="fr-FR" dirty="0"/>
+                      <a:endParaRPr lang="fr-FR" sz="2400" dirty="0"/>
                     </a:p>
                   </p:txBody>
                 </p:sp>
               </mc:Choice>
-              <mc:Fallback xmlns="">
+              <mc:Fallback>
                 <p:sp>
                   <p:nvSpPr>
                     <p:cNvPr id="62" name="ZoneTexte 61"/>
@@ -21578,8 +21576,8 @@
                   </p:nvSpPr>
                   <p:spPr>
                     <a:xfrm>
-                      <a:off x="7258834" y="3316207"/>
-                      <a:ext cx="451790" cy="369332"/>
+                      <a:off x="6724803" y="3704901"/>
+                      <a:ext cx="536557" cy="461665"/>
                     </a:xfrm>
                     <a:prstGeom prst="rect">
                       <a:avLst/>
@@ -21587,7 +21585,7 @@
                     <a:blipFill rotWithShape="0">
                       <a:blip r:embed="rId5"/>
                       <a:stretch>
-                        <a:fillRect b="-4918"/>
+                        <a:fillRect b="-10667"/>
                       </a:stretch>
                     </a:blipFill>
                   </p:spPr>
@@ -21615,10 +21613,10 @@
             </p:nvGrpSpPr>
             <p:grpSpPr>
               <a:xfrm>
-                <a:off x="6123466" y="2669805"/>
-                <a:ext cx="2321783" cy="2160000"/>
-                <a:chOff x="4061411" y="2194590"/>
-                <a:chExt cx="2321783" cy="2160000"/>
+                <a:off x="5285202" y="2635526"/>
+                <a:ext cx="2998264" cy="2194279"/>
+                <a:chOff x="3223147" y="2160311"/>
+                <a:chExt cx="2998264" cy="2194279"/>
               </a:xfrm>
             </p:grpSpPr>
             <p:cxnSp>
@@ -21829,8 +21827,8 @@
               </p:nvSpPr>
               <p:spPr>
                 <a:xfrm>
-                  <a:off x="4655002" y="2369077"/>
-                  <a:ext cx="1728192" cy="369332"/>
+                  <a:off x="3223147" y="2160311"/>
+                  <a:ext cx="1728192" cy="461665"/>
                 </a:xfrm>
                 <a:prstGeom prst="rect">
                   <a:avLst/>
@@ -21845,10 +21843,10 @@
                 <a:p>
                   <a:pPr algn="ctr"/>
                   <a:r>
-                    <a:rPr lang="fr-FR" dirty="0" smtClean="0"/>
+                    <a:rPr lang="fr-FR" sz="2400" dirty="0" smtClean="0"/>
                     <a:t>Rotor</a:t>
                   </a:r>
-                  <a:endParaRPr lang="fr-FR" dirty="0"/>
+                  <a:endParaRPr lang="fr-FR" sz="2400" dirty="0"/>
                 </a:p>
               </p:txBody>
             </p:sp>
@@ -21862,7 +21860,7 @@
           </p:nvSpPr>
           <p:spPr>
             <a:xfrm rot="16669032">
-              <a:off x="5738197" y="768009"/>
+              <a:off x="5769091" y="1250886"/>
               <a:ext cx="1850117" cy="2127382"/>
             </a:xfrm>
             <a:prstGeom prst="arc">
@@ -21902,8 +21900,8 @@
             </a:p>
           </p:txBody>
         </p:sp>
-        <mc:AlternateContent xmlns:mc="http://schemas.openxmlformats.org/markup-compatibility/2006" xmlns:a14="http://schemas.microsoft.com/office/drawing/2010/main">
-          <mc:Choice Requires="a14">
+        <mc:AlternateContent xmlns:mc="http://schemas.openxmlformats.org/markup-compatibility/2006">
+          <mc:Choice xmlns:a14="http://schemas.microsoft.com/office/drawing/2010/main" Requires="a14">
             <p:sp>
               <p:nvSpPr>
                 <p:cNvPr id="90" name="ZoneTexte 89"/>
@@ -21912,8 +21910,8 @@
               </p:nvSpPr>
               <p:spPr>
                 <a:xfrm>
-                  <a:off x="5955123" y="619072"/>
-                  <a:ext cx="469937" cy="369332"/>
+                  <a:off x="6007894" y="1044375"/>
+                  <a:ext cx="563552" cy="461665"/>
                 </a:xfrm>
                 <a:prstGeom prst="rect">
                   <a:avLst/>
@@ -21936,14 +21934,14 @@
                         <m:sSup>
                           <m:sSupPr>
                             <m:ctrlPr>
-                              <a:rPr lang="fr-FR" b="0" i="1" smtClean="0">
+                              <a:rPr lang="fr-FR" sz="2400" b="0" i="1" smtClean="0">
                                 <a:latin typeface="Cambria Math" panose="02040503050406030204" pitchFamily="18" charset="0"/>
                               </a:rPr>
                             </m:ctrlPr>
                           </m:sSupPr>
                           <m:e>
                             <m:r>
-                              <a:rPr lang="fr-FR" b="0" i="1" smtClean="0">
+                              <a:rPr lang="fr-FR" sz="2400" b="0" i="1" smtClean="0">
                                 <a:latin typeface="Cambria Math" panose="02040503050406030204" pitchFamily="18" charset="0"/>
                               </a:rPr>
                               <m:t>𝜃</m:t>
@@ -21951,7 +21949,7 @@
                           </m:e>
                           <m:sup>
                             <m:r>
-                              <a:rPr lang="fr-FR" b="0" i="1" smtClean="0">
+                              <a:rPr lang="fr-FR" sz="2400" b="0" i="1" smtClean="0">
                                 <a:latin typeface="Cambria Math" panose="02040503050406030204" pitchFamily="18" charset="0"/>
                               </a:rPr>
                               <m:t>∗</m:t>
@@ -21961,12 +21959,12 @@
                       </m:oMath>
                     </m:oMathPara>
                   </a14:m>
-                  <a:endParaRPr lang="fr-FR" dirty="0"/>
+                  <a:endParaRPr lang="fr-FR" sz="2400" dirty="0"/>
                 </a:p>
               </p:txBody>
             </p:sp>
           </mc:Choice>
-          <mc:Fallback xmlns="">
+          <mc:Fallback>
             <p:sp>
               <p:nvSpPr>
                 <p:cNvPr id="90" name="ZoneTexte 89"/>
@@ -21977,8 +21975,8 @@
               </p:nvSpPr>
               <p:spPr>
                 <a:xfrm>
-                  <a:off x="5955123" y="619072"/>
-                  <a:ext cx="469937" cy="369332"/>
+                  <a:off x="6007894" y="1044375"/>
+                  <a:ext cx="563552" cy="461665"/>
                 </a:xfrm>
                 <a:prstGeom prst="rect">
                   <a:avLst/>
@@ -23312,10 +23310,10 @@
         </p:nvGrpSpPr>
         <p:grpSpPr>
           <a:xfrm>
-            <a:off x="692500" y="1149685"/>
-            <a:ext cx="5139518" cy="3699848"/>
-            <a:chOff x="308225" y="1144435"/>
-            <a:chExt cx="5139518" cy="3699848"/>
+            <a:off x="692500" y="1087158"/>
+            <a:ext cx="5139518" cy="3762375"/>
+            <a:chOff x="308225" y="1081908"/>
+            <a:chExt cx="5139518" cy="3762375"/>
           </a:xfrm>
         </p:grpSpPr>
         <p:grpSp>
@@ -23725,10 +23723,10 @@
             </p:nvGrpSpPr>
             <p:grpSpPr>
               <a:xfrm>
-                <a:off x="3340978" y="2114747"/>
-                <a:ext cx="3678148" cy="1220334"/>
-                <a:chOff x="3340978" y="2114747"/>
-                <a:chExt cx="3678148" cy="1220334"/>
+                <a:off x="3340978" y="2091378"/>
+                <a:ext cx="3678148" cy="1243703"/>
+                <a:chOff x="3340978" y="2091378"/>
+                <a:chExt cx="3678148" cy="1243703"/>
               </a:xfrm>
             </p:grpSpPr>
             <p:sp>
@@ -23825,8 +23823,8 @@
                 </a:p>
               </p:txBody>
             </p:sp>
-            <mc:AlternateContent xmlns:mc="http://schemas.openxmlformats.org/markup-compatibility/2006" xmlns:a14="http://schemas.microsoft.com/office/drawing/2010/main">
-              <mc:Choice Requires="a14">
+            <mc:AlternateContent xmlns:mc="http://schemas.openxmlformats.org/markup-compatibility/2006">
+              <mc:Choice xmlns:a14="http://schemas.microsoft.com/office/drawing/2010/main" Requires="a14">
                 <p:sp>
                   <p:nvSpPr>
                     <p:cNvPr id="17" name="ZoneTexte 16"/>
@@ -23835,8 +23833,8 @@
                   </p:nvSpPr>
                   <p:spPr>
                     <a:xfrm>
-                      <a:off x="4713802" y="2114747"/>
-                      <a:ext cx="474938" cy="391261"/>
+                      <a:off x="4500031" y="2091378"/>
+                      <a:ext cx="569578" cy="490840"/>
                     </a:xfrm>
                     <a:prstGeom prst="rect">
                       <a:avLst/>
@@ -23859,14 +23857,14 @@
                             <m:sSub>
                               <m:sSubPr>
                                 <m:ctrlPr>
-                                  <a:rPr lang="fr-FR" b="0" i="1" smtClean="0">
+                                  <a:rPr lang="fr-FR" sz="2400" b="0" i="1" smtClean="0">
                                     <a:latin typeface="Cambria Math" panose="02040503050406030204" pitchFamily="18" charset="0"/>
                                   </a:rPr>
                                 </m:ctrlPr>
                               </m:sSubPr>
                               <m:e>
                                 <m:r>
-                                  <a:rPr lang="fr-FR" b="0" i="1" smtClean="0">
+                                  <a:rPr lang="fr-FR" sz="2400" b="0" i="1" smtClean="0">
                                     <a:latin typeface="Cambria Math" panose="02040503050406030204" pitchFamily="18" charset="0"/>
                                   </a:rPr>
                                   <m:t>𝜃</m:t>
@@ -23874,7 +23872,7 @@
                               </m:e>
                               <m:sub>
                                 <m:r>
-                                  <a:rPr lang="fr-FR" b="0" i="1" smtClean="0">
+                                  <a:rPr lang="fr-FR" sz="2400" b="0" i="1" smtClean="0">
                                     <a:latin typeface="Cambria Math" panose="02040503050406030204" pitchFamily="18" charset="0"/>
                                   </a:rPr>
                                   <m:t>𝑦</m:t>
@@ -23884,12 +23882,12 @@
                           </m:oMath>
                         </m:oMathPara>
                       </a14:m>
-                      <a:endParaRPr lang="fr-FR" dirty="0"/>
+                      <a:endParaRPr lang="fr-FR" sz="2400" dirty="0"/>
                     </a:p>
                   </p:txBody>
                 </p:sp>
               </mc:Choice>
-              <mc:Fallback xmlns="">
+              <mc:Fallback>
                 <p:sp>
                   <p:nvSpPr>
                     <p:cNvPr id="17" name="ZoneTexte 16"/>
@@ -23900,8 +23898,8 @@
                   </p:nvSpPr>
                   <p:spPr>
                     <a:xfrm>
-                      <a:off x="4713802" y="2114747"/>
-                      <a:ext cx="474938" cy="391261"/>
+                      <a:off x="4500031" y="2091378"/>
+                      <a:ext cx="569578" cy="490840"/>
                     </a:xfrm>
                     <a:prstGeom prst="rect">
                       <a:avLst/>
@@ -23909,7 +23907,7 @@
                     <a:blipFill rotWithShape="0">
                       <a:blip r:embed="rId4"/>
                       <a:stretch>
-                        <a:fillRect b="-3077"/>
+                        <a:fillRect b="-6250"/>
                       </a:stretch>
                     </a:blipFill>
                   </p:spPr>
@@ -23938,8 +23936,8 @@
           </p:nvSpPr>
           <p:spPr>
             <a:xfrm>
-              <a:off x="2831796" y="1144435"/>
-              <a:ext cx="1128530" cy="372139"/>
+              <a:off x="2739542" y="1081908"/>
+              <a:ext cx="1675766" cy="461665"/>
             </a:xfrm>
             <a:prstGeom prst="rect">
               <a:avLst/>
@@ -23954,10 +23952,10 @@
             <a:p>
               <a:pPr algn="ctr"/>
               <a:r>
-                <a:rPr lang="fr-FR" dirty="0" smtClean="0"/>
+                <a:rPr lang="fr-FR" sz="2400" dirty="0" smtClean="0"/>
                 <a:t>Coussinet</a:t>
               </a:r>
-              <a:endParaRPr lang="fr-FR" dirty="0"/>
+              <a:endParaRPr lang="fr-FR" sz="2400" dirty="0"/>
             </a:p>
           </p:txBody>
         </p:sp>
@@ -23970,7 +23968,7 @@
           <p:spPr>
             <a:xfrm>
               <a:off x="869228" y="1933823"/>
-              <a:ext cx="880407" cy="369332"/>
+              <a:ext cx="880407" cy="461665"/>
             </a:xfrm>
             <a:prstGeom prst="rect">
               <a:avLst/>
@@ -23985,10 +23983,10 @@
             <a:p>
               <a:pPr algn="ctr"/>
               <a:r>
-                <a:rPr lang="fr-FR" dirty="0" smtClean="0"/>
+                <a:rPr lang="fr-FR" sz="2400" dirty="0" smtClean="0"/>
                 <a:t>Rotor</a:t>
               </a:r>
-              <a:endParaRPr lang="fr-FR" dirty="0"/>
+              <a:endParaRPr lang="fr-FR" sz="2400" dirty="0"/>
             </a:p>
           </p:txBody>
         </p:sp>
@@ -24001,10 +23999,10 @@
         </p:nvGrpSpPr>
         <p:grpSpPr>
           <a:xfrm>
-            <a:off x="5832018" y="1120227"/>
-            <a:ext cx="5139518" cy="3729306"/>
-            <a:chOff x="5714998" y="1112170"/>
-            <a:chExt cx="5139518" cy="3729306"/>
+            <a:off x="5832018" y="1069413"/>
+            <a:ext cx="5203894" cy="3872453"/>
+            <a:chOff x="5714998" y="1061356"/>
+            <a:chExt cx="5203894" cy="3872453"/>
           </a:xfrm>
         </p:grpSpPr>
         <p:grpSp>
@@ -24016,9 +24014,9 @@
           <p:grpSpPr>
             <a:xfrm>
               <a:off x="5714998" y="1160981"/>
-              <a:ext cx="5139518" cy="3680495"/>
+              <a:ext cx="5203894" cy="3772828"/>
               <a:chOff x="2804845" y="1212351"/>
-              <a:chExt cx="5139518" cy="3680495"/>
+              <a:chExt cx="5203894" cy="3772828"/>
             </a:xfrm>
           </p:grpSpPr>
           <p:grpSp>
@@ -24030,9 +24028,9 @@
             <p:grpSpPr>
               <a:xfrm>
                 <a:off x="2804845" y="1212351"/>
-                <a:ext cx="5139518" cy="3680495"/>
+                <a:ext cx="5203894" cy="3772828"/>
                 <a:chOff x="2804845" y="1212351"/>
-                <a:chExt cx="5139518" cy="3680495"/>
+                <a:chExt cx="5203894" cy="3772828"/>
               </a:xfrm>
             </p:grpSpPr>
             <p:grpSp>
@@ -24155,9 +24153,9 @@
               <p:grpSpPr>
                 <a:xfrm>
                   <a:off x="2804845" y="1212351"/>
-                  <a:ext cx="5139518" cy="3680495"/>
+                  <a:ext cx="5203894" cy="3772828"/>
                   <a:chOff x="2804845" y="1212351"/>
-                  <a:chExt cx="5139518" cy="3680495"/>
+                  <a:chExt cx="5203894" cy="3772828"/>
                 </a:xfrm>
               </p:grpSpPr>
               <p:cxnSp>
@@ -24236,8 +24234,8 @@
                   </a:fontRef>
                 </p:style>
               </p:cxnSp>
-              <mc:AlternateContent xmlns:mc="http://schemas.openxmlformats.org/markup-compatibility/2006" xmlns:a14="http://schemas.microsoft.com/office/drawing/2010/main">
-                <mc:Choice Requires="a14">
+              <mc:AlternateContent xmlns:mc="http://schemas.openxmlformats.org/markup-compatibility/2006">
+                <mc:Choice xmlns:a14="http://schemas.microsoft.com/office/drawing/2010/main" Requires="a14">
                   <p:sp>
                     <p:nvSpPr>
                       <p:cNvPr id="31" name="ZoneTexte 30"/>
@@ -24247,7 +24245,7 @@
                     <p:spPr>
                       <a:xfrm>
                         <a:off x="5152781" y="4523514"/>
-                        <a:ext cx="382669" cy="369332"/>
+                        <a:ext cx="447045" cy="461665"/>
                       </a:xfrm>
                       <a:prstGeom prst="rect">
                         <a:avLst/>
@@ -24268,7 +24266,7 @@
                             </m:oMathParaPr>
                             <m:oMath xmlns:m="http://schemas.openxmlformats.org/officeDocument/2006/math">
                               <m:r>
-                                <a:rPr lang="fr-FR" b="0" i="1" smtClean="0">
+                                <a:rPr lang="fr-FR" sz="2400" b="0" i="1" smtClean="0">
                                   <a:latin typeface="Cambria Math" panose="02040503050406030204" pitchFamily="18" charset="0"/>
                                 </a:rPr>
                                 <m:t>𝑌</m:t>
@@ -24276,12 +24274,12 @@
                             </m:oMath>
                           </m:oMathPara>
                         </a14:m>
-                        <a:endParaRPr lang="fr-FR" dirty="0"/>
+                        <a:endParaRPr lang="fr-FR" sz="2400" dirty="0"/>
                       </a:p>
                     </p:txBody>
                   </p:sp>
                 </mc:Choice>
-                <mc:Fallback xmlns="">
+                <mc:Fallback>
                   <p:sp>
                     <p:nvSpPr>
                       <p:cNvPr id="31" name="ZoneTexte 30"/>
@@ -24293,7 +24291,7 @@
                     <p:spPr>
                       <a:xfrm>
                         <a:off x="5152781" y="4523514"/>
-                        <a:ext cx="382669" cy="369332"/>
+                        <a:ext cx="447045" cy="461665"/>
                       </a:xfrm>
                       <a:prstGeom prst="rect">
                         <a:avLst/>
@@ -24320,8 +24318,8 @@
                   </p:sp>
                 </mc:Fallback>
               </mc:AlternateContent>
-              <mc:AlternateContent xmlns:mc="http://schemas.openxmlformats.org/markup-compatibility/2006" xmlns:a14="http://schemas.microsoft.com/office/drawing/2010/main">
-                <mc:Choice Requires="a14">
+              <mc:AlternateContent xmlns:mc="http://schemas.openxmlformats.org/markup-compatibility/2006">
+                <mc:Choice xmlns:a14="http://schemas.microsoft.com/office/drawing/2010/main" Requires="a14">
                   <p:sp>
                     <p:nvSpPr>
                       <p:cNvPr id="32" name="ZoneTexte 31"/>
@@ -24331,7 +24329,7 @@
                     <p:spPr>
                       <a:xfrm>
                         <a:off x="7564900" y="2549377"/>
-                        <a:ext cx="379463" cy="369332"/>
+                        <a:ext cx="443839" cy="461665"/>
                       </a:xfrm>
                       <a:prstGeom prst="rect">
                         <a:avLst/>
@@ -24352,7 +24350,7 @@
                             </m:oMathParaPr>
                             <m:oMath xmlns:m="http://schemas.openxmlformats.org/officeDocument/2006/math">
                               <m:r>
-                                <a:rPr lang="fr-FR" b="0" i="1" smtClean="0">
+                                <a:rPr lang="fr-FR" sz="2400" b="0" i="1" smtClean="0">
                                   <a:latin typeface="Cambria Math" panose="02040503050406030204" pitchFamily="18" charset="0"/>
                                 </a:rPr>
                                 <m:t>𝑍</m:t>
@@ -24360,12 +24358,12 @@
                             </m:oMath>
                           </m:oMathPara>
                         </a14:m>
-                        <a:endParaRPr lang="fr-FR" dirty="0"/>
+                        <a:endParaRPr lang="fr-FR" sz="2400" dirty="0"/>
                       </a:p>
                     </p:txBody>
                   </p:sp>
                 </mc:Choice>
-                <mc:Fallback xmlns="">
+                <mc:Fallback>
                   <p:sp>
                     <p:nvSpPr>
                       <p:cNvPr id="32" name="ZoneTexte 31"/>
@@ -24377,7 +24375,7 @@
                     <p:spPr>
                       <a:xfrm>
                         <a:off x="7564900" y="2549377"/>
-                        <a:ext cx="379463" cy="369332"/>
+                        <a:ext cx="443839" cy="461665"/>
                       </a:xfrm>
                       <a:prstGeom prst="rect">
                         <a:avLst/>
@@ -24514,8 +24512,8 @@
                 </a:p>
               </p:txBody>
             </p:sp>
-            <mc:AlternateContent xmlns:mc="http://schemas.openxmlformats.org/markup-compatibility/2006" xmlns:a14="http://schemas.microsoft.com/office/drawing/2010/main">
-              <mc:Choice Requires="a14">
+            <mc:AlternateContent xmlns:mc="http://schemas.openxmlformats.org/markup-compatibility/2006">
+              <mc:Choice xmlns:a14="http://schemas.microsoft.com/office/drawing/2010/main" Requires="a14">
                 <p:sp>
                   <p:nvSpPr>
                     <p:cNvPr id="26" name="ZoneTexte 25"/>
@@ -24525,7 +24523,7 @@
                   <p:spPr>
                     <a:xfrm>
                       <a:off x="4621864" y="2860891"/>
-                      <a:ext cx="467307" cy="369332"/>
+                      <a:ext cx="560538" cy="461665"/>
                     </a:xfrm>
                     <a:prstGeom prst="rect">
                       <a:avLst/>
@@ -24548,14 +24546,14 @@
                             <m:sSub>
                               <m:sSubPr>
                                 <m:ctrlPr>
-                                  <a:rPr lang="fr-FR" b="0" i="1" smtClean="0">
+                                  <a:rPr lang="fr-FR" sz="2400" b="0" i="1" smtClean="0">
                                     <a:latin typeface="Cambria Math" panose="02040503050406030204" pitchFamily="18" charset="0"/>
                                   </a:rPr>
                                 </m:ctrlPr>
                               </m:sSubPr>
                               <m:e>
                                 <m:r>
-                                  <a:rPr lang="fr-FR" b="0" i="1" smtClean="0">
+                                  <a:rPr lang="fr-FR" sz="2400" b="0" i="1" smtClean="0">
                                     <a:latin typeface="Cambria Math" panose="02040503050406030204" pitchFamily="18" charset="0"/>
                                   </a:rPr>
                                   <m:t>𝜃</m:t>
@@ -24563,7 +24561,7 @@
                               </m:e>
                               <m:sub>
                                 <m:r>
-                                  <a:rPr lang="fr-FR" b="0" i="1" smtClean="0">
+                                  <a:rPr lang="fr-FR" sz="2400" b="0" i="1" smtClean="0">
                                     <a:latin typeface="Cambria Math" panose="02040503050406030204" pitchFamily="18" charset="0"/>
                                   </a:rPr>
                                   <m:t>𝑥</m:t>
@@ -24573,12 +24571,12 @@
                           </m:oMath>
                         </m:oMathPara>
                       </a14:m>
-                      <a:endParaRPr lang="fr-FR" dirty="0"/>
+                      <a:endParaRPr lang="fr-FR" sz="2400" dirty="0"/>
                     </a:p>
                   </p:txBody>
                 </p:sp>
               </mc:Choice>
-              <mc:Fallback xmlns="">
+              <mc:Fallback>
                 <p:sp>
                   <p:nvSpPr>
                     <p:cNvPr id="26" name="ZoneTexte 25"/>
@@ -24590,7 +24588,7 @@
                   <p:spPr>
                     <a:xfrm>
                       <a:off x="4621864" y="2860891"/>
-                      <a:ext cx="467307" cy="369332"/>
+                      <a:ext cx="560538" cy="461665"/>
                     </a:xfrm>
                     <a:prstGeom prst="rect">
                       <a:avLst/>
@@ -24627,8 +24625,8 @@
           </p:nvSpPr>
           <p:spPr>
             <a:xfrm>
-              <a:off x="8414984" y="1112170"/>
-              <a:ext cx="1128530" cy="372139"/>
+              <a:off x="8210253" y="1061356"/>
+              <a:ext cx="1690598" cy="461665"/>
             </a:xfrm>
             <a:prstGeom prst="rect">
               <a:avLst/>
@@ -24643,10 +24641,10 @@
             <a:p>
               <a:pPr algn="ctr"/>
               <a:r>
-                <a:rPr lang="fr-FR" dirty="0" smtClean="0"/>
+                <a:rPr lang="fr-FR" sz="2400" dirty="0" smtClean="0"/>
                 <a:t>Coussinet</a:t>
               </a:r>
-              <a:endParaRPr lang="fr-FR" dirty="0"/>
+              <a:endParaRPr lang="fr-FR" sz="2400" dirty="0"/>
             </a:p>
           </p:txBody>
         </p:sp>
@@ -24659,7 +24657,7 @@
           <p:spPr>
             <a:xfrm>
               <a:off x="9020444" y="1878711"/>
-              <a:ext cx="880407" cy="369332"/>
+              <a:ext cx="880407" cy="461665"/>
             </a:xfrm>
             <a:prstGeom prst="rect">
               <a:avLst/>
@@ -24674,10 +24672,10 @@
             <a:p>
               <a:pPr algn="ctr"/>
               <a:r>
-                <a:rPr lang="fr-FR" dirty="0" smtClean="0"/>
+                <a:rPr lang="fr-FR" sz="2400" dirty="0" smtClean="0"/>
                 <a:t>Rotor</a:t>
               </a:r>
-              <a:endParaRPr lang="fr-FR" dirty="0"/>
+              <a:endParaRPr lang="fr-FR" sz="2400" dirty="0"/>
             </a:p>
           </p:txBody>
         </p:sp>
@@ -28059,8 +28057,8 @@
                 </a:fontRef>
               </p:style>
             </p:cxnSp>
-            <mc:AlternateContent xmlns:mc="http://schemas.openxmlformats.org/markup-compatibility/2006">
-              <mc:Choice xmlns:a14="http://schemas.microsoft.com/office/drawing/2010/main" Requires="a14">
+            <mc:AlternateContent xmlns:mc="http://schemas.openxmlformats.org/markup-compatibility/2006" xmlns:a14="http://schemas.microsoft.com/office/drawing/2010/main">
+              <mc:Choice Requires="a14">
                 <p:sp>
                   <p:nvSpPr>
                     <p:cNvPr id="38" name="ZoneTexte 37"/>
@@ -28112,7 +28110,7 @@
                   </p:txBody>
                 </p:sp>
               </mc:Choice>
-              <mc:Fallback>
+              <mc:Fallback xmlns="">
                 <p:sp>
                   <p:nvSpPr>
                     <p:cNvPr id="38" name="ZoneTexte 37"/>
@@ -28152,8 +28150,8 @@
               </mc:Fallback>
             </mc:AlternateContent>
           </p:grpSp>
-          <mc:AlternateContent xmlns:mc="http://schemas.openxmlformats.org/markup-compatibility/2006">
-            <mc:Choice xmlns:a14="http://schemas.microsoft.com/office/drawing/2010/main" Requires="a14">
+          <mc:AlternateContent xmlns:mc="http://schemas.openxmlformats.org/markup-compatibility/2006" xmlns:a14="http://schemas.microsoft.com/office/drawing/2010/main">
+            <mc:Choice Requires="a14">
               <p:sp>
                 <p:nvSpPr>
                   <p:cNvPr id="44" name="ZoneTexte 43"/>
@@ -28228,7 +28226,7 @@
                 </p:txBody>
               </p:sp>
             </mc:Choice>
-            <mc:Fallback>
+            <mc:Fallback xmlns="">
               <p:sp>
                 <p:nvSpPr>
                   <p:cNvPr id="44" name="ZoneTexte 43"/>
@@ -28267,8 +28265,8 @@
               </p:sp>
             </mc:Fallback>
           </mc:AlternateContent>
-          <mc:AlternateContent xmlns:mc="http://schemas.openxmlformats.org/markup-compatibility/2006">
-            <mc:Choice xmlns:a14="http://schemas.microsoft.com/office/drawing/2010/main" Requires="a14">
+          <mc:AlternateContent xmlns:mc="http://schemas.openxmlformats.org/markup-compatibility/2006" xmlns:a14="http://schemas.microsoft.com/office/drawing/2010/main">
+            <mc:Choice Requires="a14">
               <p:sp>
                 <p:nvSpPr>
                   <p:cNvPr id="45" name="ZoneTexte 44"/>
@@ -28331,7 +28329,7 @@
                 </p:txBody>
               </p:sp>
             </mc:Choice>
-            <mc:Fallback>
+            <mc:Fallback xmlns="">
               <p:sp>
                 <p:nvSpPr>
                   <p:cNvPr id="45" name="ZoneTexte 44"/>
@@ -28370,8 +28368,8 @@
               </p:sp>
             </mc:Fallback>
           </mc:AlternateContent>
-          <mc:AlternateContent xmlns:mc="http://schemas.openxmlformats.org/markup-compatibility/2006">
-            <mc:Choice xmlns:a14="http://schemas.microsoft.com/office/drawing/2010/main" Requires="a14">
+          <mc:AlternateContent xmlns:mc="http://schemas.openxmlformats.org/markup-compatibility/2006" xmlns:a14="http://schemas.microsoft.com/office/drawing/2010/main">
+            <mc:Choice Requires="a14">
               <p:sp>
                 <p:nvSpPr>
                   <p:cNvPr id="46" name="ZoneTexte 45"/>
@@ -28446,7 +28444,7 @@
                 </p:txBody>
               </p:sp>
             </mc:Choice>
-            <mc:Fallback>
+            <mc:Fallback xmlns="">
               <p:sp>
                 <p:nvSpPr>
                   <p:cNvPr id="46" name="ZoneTexte 45"/>
@@ -31360,8 +31358,8 @@
               <a:chExt cx="2392083" cy="1649653"/>
             </a:xfrm>
           </p:grpSpPr>
-          <mc:AlternateContent xmlns:mc="http://schemas.openxmlformats.org/markup-compatibility/2006">
-            <mc:Choice xmlns:a14="http://schemas.microsoft.com/office/drawing/2010/main" Requires="a14">
+          <mc:AlternateContent xmlns:mc="http://schemas.openxmlformats.org/markup-compatibility/2006" xmlns:a14="http://schemas.microsoft.com/office/drawing/2010/main">
+            <mc:Choice Requires="a14">
               <p:sp>
                 <p:nvSpPr>
                   <p:cNvPr id="146" name="Rectangle 145"/>
@@ -31456,7 +31454,7 @@
                 </p:txBody>
               </p:sp>
             </mc:Choice>
-            <mc:Fallback>
+            <mc:Fallback xmlns="">
               <p:sp>
                 <p:nvSpPr>
                   <p:cNvPr id="146" name="Rectangle 145"/>
@@ -31509,8 +31507,8 @@
                 <a:chExt cx="2392083" cy="1649653"/>
               </a:xfrm>
             </p:grpSpPr>
-            <mc:AlternateContent xmlns:mc="http://schemas.openxmlformats.org/markup-compatibility/2006">
-              <mc:Choice xmlns:a14="http://schemas.microsoft.com/office/drawing/2010/main" Requires="a14">
+            <mc:AlternateContent xmlns:mc="http://schemas.openxmlformats.org/markup-compatibility/2006" xmlns:a14="http://schemas.microsoft.com/office/drawing/2010/main">
+              <mc:Choice Requires="a14">
                 <p:sp>
                   <p:nvSpPr>
                     <p:cNvPr id="148" name="ZoneTexte 147"/>
@@ -31533,6 +31531,7 @@
                     </a:bodyPr>
                     <a:lstStyle/>
                     <a:p>
+                      <a:pPr/>
                       <a14:m>
                         <m:oMathPara xmlns:m="http://schemas.openxmlformats.org/officeDocument/2006/math">
                           <m:oMathParaPr>
@@ -31564,7 +31563,7 @@
                   </p:txBody>
                 </p:sp>
               </mc:Choice>
-              <mc:Fallback>
+              <mc:Fallback xmlns="">
                 <p:sp>
                   <p:nvSpPr>
                     <p:cNvPr id="148" name="ZoneTexte 147"/>
@@ -31603,8 +31602,8 @@
                 </p:sp>
               </mc:Fallback>
             </mc:AlternateContent>
-            <mc:AlternateContent xmlns:mc="http://schemas.openxmlformats.org/markup-compatibility/2006">
-              <mc:Choice xmlns:a14="http://schemas.microsoft.com/office/drawing/2010/main" Requires="a14">
+            <mc:AlternateContent xmlns:mc="http://schemas.openxmlformats.org/markup-compatibility/2006" xmlns:a14="http://schemas.microsoft.com/office/drawing/2010/main">
+              <mc:Choice Requires="a14">
                 <p:sp>
                   <p:nvSpPr>
                     <p:cNvPr id="149" name="ZoneTexte 148"/>
@@ -31648,7 +31647,7 @@
                   </p:txBody>
                 </p:sp>
               </mc:Choice>
-              <mc:Fallback>
+              <mc:Fallback xmlns="">
                 <p:sp>
                   <p:nvSpPr>
                     <p:cNvPr id="149" name="ZoneTexte 148"/>
@@ -31687,8 +31686,8 @@
                 </p:sp>
               </mc:Fallback>
             </mc:AlternateContent>
-            <mc:AlternateContent xmlns:mc="http://schemas.openxmlformats.org/markup-compatibility/2006">
-              <mc:Choice xmlns:a14="http://schemas.microsoft.com/office/drawing/2010/main" Requires="a14">
+            <mc:AlternateContent xmlns:mc="http://schemas.openxmlformats.org/markup-compatibility/2006" xmlns:a14="http://schemas.microsoft.com/office/drawing/2010/main">
+              <mc:Choice Requires="a14">
                 <p:sp>
                   <p:nvSpPr>
                     <p:cNvPr id="150" name="ZoneTexte 149"/>
@@ -31732,7 +31731,7 @@
                   </p:txBody>
                 </p:sp>
               </mc:Choice>
-              <mc:Fallback>
+              <mc:Fallback xmlns="">
                 <p:sp>
                   <p:nvSpPr>
                     <p:cNvPr id="150" name="ZoneTexte 149"/>
@@ -31771,8 +31770,8 @@
                 </p:sp>
               </mc:Fallback>
             </mc:AlternateContent>
-            <mc:AlternateContent xmlns:mc="http://schemas.openxmlformats.org/markup-compatibility/2006">
-              <mc:Choice xmlns:a14="http://schemas.microsoft.com/office/drawing/2010/main" Requires="a14">
+            <mc:AlternateContent xmlns:mc="http://schemas.openxmlformats.org/markup-compatibility/2006" xmlns:a14="http://schemas.microsoft.com/office/drawing/2010/main">
+              <mc:Choice Requires="a14">
                 <p:sp>
                   <p:nvSpPr>
                     <p:cNvPr id="151" name="ZoneTexte 150"/>
@@ -31816,7 +31815,7 @@
                   </p:txBody>
                 </p:sp>
               </mc:Choice>
-              <mc:Fallback>
+              <mc:Fallback xmlns="">
                 <p:sp>
                   <p:nvSpPr>
                     <p:cNvPr id="151" name="ZoneTexte 150"/>
@@ -32001,8 +32000,8 @@
             </p:cxnSp>
           </p:grpSp>
         </p:grpSp>
-        <mc:AlternateContent xmlns:mc="http://schemas.openxmlformats.org/markup-compatibility/2006">
-          <mc:Choice xmlns:a14="http://schemas.microsoft.com/office/drawing/2010/main" Requires="a14">
+        <mc:AlternateContent xmlns:mc="http://schemas.openxmlformats.org/markup-compatibility/2006" xmlns:a14="http://schemas.microsoft.com/office/drawing/2010/main">
+          <mc:Choice Requires="a14">
             <p:sp>
               <p:nvSpPr>
                 <p:cNvPr id="156" name="Rectangle 155"/>
@@ -32082,7 +32081,7 @@
               </p:txBody>
             </p:sp>
           </mc:Choice>
-          <mc:Fallback>
+          <mc:Fallback xmlns="">
             <p:sp>
               <p:nvSpPr>
                 <p:cNvPr id="156" name="Rectangle 155"/>
@@ -32267,7 +32266,6 @@
                 <a:rPr lang="fr-FR" sz="1400" b="1" dirty="0"/>
                 <a:t>P</a:t>
               </a:r>
-              <a:endParaRPr lang="fr-FR" sz="1400" b="1" dirty="0"/>
             </a:p>
           </p:txBody>
         </p:sp>
@@ -35027,21 +35025,21 @@
                     <a:gridCol w="4805518">
                       <a:extLst>
                         <a:ext uri="{9D8B030D-6E8A-4147-A177-3AD203B41FA5}">
-                          <a16:colId xmlns="" xmlns:a16="http://schemas.microsoft.com/office/drawing/2014/main" val="3081511506"/>
+                          <a16:colId xmlns:a16="http://schemas.microsoft.com/office/drawing/2014/main" xmlns="" val="3081511506"/>
                         </a:ext>
                       </a:extLst>
                     </a:gridCol>
                     <a:gridCol w="1765060">
                       <a:extLst>
                         <a:ext uri="{9D8B030D-6E8A-4147-A177-3AD203B41FA5}">
-                          <a16:colId xmlns="" xmlns:a16="http://schemas.microsoft.com/office/drawing/2014/main" val="1214192377"/>
+                          <a16:colId xmlns:a16="http://schemas.microsoft.com/office/drawing/2014/main" xmlns="" val="1214192377"/>
                         </a:ext>
                       </a:extLst>
                     </a:gridCol>
                     <a:gridCol w="2685045">
                       <a:extLst>
                         <a:ext uri="{9D8B030D-6E8A-4147-A177-3AD203B41FA5}">
-                          <a16:colId xmlns="" xmlns:a16="http://schemas.microsoft.com/office/drawing/2014/main" val="3830110329"/>
+                          <a16:colId xmlns:a16="http://schemas.microsoft.com/office/drawing/2014/main" xmlns="" val="3830110329"/>
                         </a:ext>
                       </a:extLst>
                     </a:gridCol>
@@ -35094,7 +35092,7 @@
                     </a:tc>
                     <a:extLst>
                       <a:ext uri="{0D108BD9-81ED-4DB2-BD59-A6C34878D82A}">
-                        <a16:rowId xmlns="" xmlns:a16="http://schemas.microsoft.com/office/drawing/2014/main" val="3865599143"/>
+                        <a16:rowId xmlns:a16="http://schemas.microsoft.com/office/drawing/2014/main" xmlns="" val="3865599143"/>
                       </a:ext>
                     </a:extLst>
                   </a:tr>
@@ -35176,7 +35174,7 @@
                     </a:tc>
                     <a:extLst>
                       <a:ext uri="{0D108BD9-81ED-4DB2-BD59-A6C34878D82A}">
-                        <a16:rowId xmlns="" xmlns:a16="http://schemas.microsoft.com/office/drawing/2014/main" val="239526169"/>
+                        <a16:rowId xmlns:a16="http://schemas.microsoft.com/office/drawing/2014/main" xmlns="" val="239526169"/>
                       </a:ext>
                     </a:extLst>
                   </a:tr>
@@ -35258,7 +35256,7 @@
                     </a:tc>
                     <a:extLst>
                       <a:ext uri="{0D108BD9-81ED-4DB2-BD59-A6C34878D82A}">
-                        <a16:rowId xmlns="" xmlns:a16="http://schemas.microsoft.com/office/drawing/2014/main" val="635204047"/>
+                        <a16:rowId xmlns:a16="http://schemas.microsoft.com/office/drawing/2014/main" xmlns="" val="635204047"/>
                       </a:ext>
                     </a:extLst>
                   </a:tr>
@@ -35321,7 +35319,7 @@
                     </a:tc>
                     <a:extLst>
                       <a:ext uri="{0D108BD9-81ED-4DB2-BD59-A6C34878D82A}">
-                        <a16:rowId xmlns="" xmlns:a16="http://schemas.microsoft.com/office/drawing/2014/main" val="803137917"/>
+                        <a16:rowId xmlns:a16="http://schemas.microsoft.com/office/drawing/2014/main" xmlns="" val="803137917"/>
                       </a:ext>
                     </a:extLst>
                   </a:tr>
@@ -35388,7 +35386,7 @@
                     </a:tc>
                     <a:extLst>
                       <a:ext uri="{0D108BD9-81ED-4DB2-BD59-A6C34878D82A}">
-                        <a16:rowId xmlns="" xmlns:a16="http://schemas.microsoft.com/office/drawing/2014/main" val="3808520189"/>
+                        <a16:rowId xmlns:a16="http://schemas.microsoft.com/office/drawing/2014/main" xmlns="" val="3808520189"/>
                       </a:ext>
                     </a:extLst>
                   </a:tr>
@@ -35488,7 +35486,7 @@
                     </a:tc>
                     <a:extLst>
                       <a:ext uri="{0D108BD9-81ED-4DB2-BD59-A6C34878D82A}">
-                        <a16:rowId xmlns="" xmlns:a16="http://schemas.microsoft.com/office/drawing/2014/main" val="2470517530"/>
+                        <a16:rowId xmlns:a16="http://schemas.microsoft.com/office/drawing/2014/main" xmlns="" val="2470517530"/>
                       </a:ext>
                     </a:extLst>
                   </a:tr>
@@ -35570,7 +35568,7 @@
                     </a:tc>
                     <a:extLst>
                       <a:ext uri="{0D108BD9-81ED-4DB2-BD59-A6C34878D82A}">
-                        <a16:rowId xmlns="" xmlns:a16="http://schemas.microsoft.com/office/drawing/2014/main" val="1342816855"/>
+                        <a16:rowId xmlns:a16="http://schemas.microsoft.com/office/drawing/2014/main" xmlns="" val="1342816855"/>
                       </a:ext>
                     </a:extLst>
                   </a:tr>
@@ -35633,7 +35631,7 @@
                     </a:tc>
                     <a:extLst>
                       <a:ext uri="{0D108BD9-81ED-4DB2-BD59-A6C34878D82A}">
-                        <a16:rowId xmlns="" xmlns:a16="http://schemas.microsoft.com/office/drawing/2014/main" val="3480795511"/>
+                        <a16:rowId xmlns:a16="http://schemas.microsoft.com/office/drawing/2014/main" xmlns="" val="3480795511"/>
                       </a:ext>
                     </a:extLst>
                   </a:tr>
@@ -35715,7 +35713,7 @@
                     </a:tc>
                     <a:extLst>
                       <a:ext uri="{0D108BD9-81ED-4DB2-BD59-A6C34878D82A}">
-                        <a16:rowId xmlns="" xmlns:a16="http://schemas.microsoft.com/office/drawing/2014/main" val="239401366"/>
+                        <a16:rowId xmlns:a16="http://schemas.microsoft.com/office/drawing/2014/main" xmlns="" val="239401366"/>
                       </a:ext>
                     </a:extLst>
                   </a:tr>
@@ -35786,7 +35784,7 @@
                     </a:tc>
                     <a:extLst>
                       <a:ext uri="{0D108BD9-81ED-4DB2-BD59-A6C34878D82A}">
-                        <a16:rowId xmlns="" xmlns:a16="http://schemas.microsoft.com/office/drawing/2014/main" val="3205225442"/>
+                        <a16:rowId xmlns:a16="http://schemas.microsoft.com/office/drawing/2014/main" xmlns="" val="3205225442"/>
                       </a:ext>
                     </a:extLst>
                   </a:tr>
@@ -35881,7 +35879,7 @@
                     </a:tc>
                     <a:extLst>
                       <a:ext uri="{0D108BD9-81ED-4DB2-BD59-A6C34878D82A}">
-                        <a16:rowId xmlns="" xmlns:a16="http://schemas.microsoft.com/office/drawing/2014/main" val="2472454817"/>
+                        <a16:rowId xmlns:a16="http://schemas.microsoft.com/office/drawing/2014/main" xmlns="" val="2472454817"/>
                       </a:ext>
                     </a:extLst>
                   </a:tr>
@@ -35967,7 +35965,7 @@
                     </a:tc>
                     <a:extLst>
                       <a:ext uri="{0D108BD9-81ED-4DB2-BD59-A6C34878D82A}">
-                        <a16:rowId xmlns="" xmlns:a16="http://schemas.microsoft.com/office/drawing/2014/main" val="4131336601"/>
+                        <a16:rowId xmlns:a16="http://schemas.microsoft.com/office/drawing/2014/main" xmlns="" val="4131336601"/>
                       </a:ext>
                     </a:extLst>
                   </a:tr>
@@ -36057,7 +36055,7 @@
                     </a:tc>
                     <a:extLst>
                       <a:ext uri="{0D108BD9-81ED-4DB2-BD59-A6C34878D82A}">
-                        <a16:rowId xmlns="" xmlns:a16="http://schemas.microsoft.com/office/drawing/2014/main" val="1566769430"/>
+                        <a16:rowId xmlns:a16="http://schemas.microsoft.com/office/drawing/2014/main" xmlns="" val="1566769430"/>
                       </a:ext>
                     </a:extLst>
                   </a:tr>
@@ -36161,7 +36159,7 @@
                     </a:tc>
                     <a:extLst>
                       <a:ext uri="{0D108BD9-81ED-4DB2-BD59-A6C34878D82A}">
-                        <a16:rowId xmlns="" xmlns:a16="http://schemas.microsoft.com/office/drawing/2014/main" val="3641553268"/>
+                        <a16:rowId xmlns:a16="http://schemas.microsoft.com/office/drawing/2014/main" xmlns="" val="3641553268"/>
                       </a:ext>
                     </a:extLst>
                   </a:tr>
@@ -36253,7 +36251,7 @@
                     </a:tc>
                     <a:extLst>
                       <a:ext uri="{0D108BD9-81ED-4DB2-BD59-A6C34878D82A}">
-                        <a16:rowId xmlns="" xmlns:a16="http://schemas.microsoft.com/office/drawing/2014/main" val="802662070"/>
+                        <a16:rowId xmlns:a16="http://schemas.microsoft.com/office/drawing/2014/main" xmlns="" val="802662070"/>
                       </a:ext>
                     </a:extLst>
                   </a:tr>
@@ -36345,7 +36343,7 @@
                     </a:tc>
                     <a:extLst>
                       <a:ext uri="{0D108BD9-81ED-4DB2-BD59-A6C34878D82A}">
-                        <a16:rowId xmlns="" xmlns:a16="http://schemas.microsoft.com/office/drawing/2014/main" val="3754366970"/>
+                        <a16:rowId xmlns:a16="http://schemas.microsoft.com/office/drawing/2014/main" xmlns="" val="3754366970"/>
                       </a:ext>
                     </a:extLst>
                   </a:tr>

</xml_diff>